<commit_message>
Updated DOE slides. Adding programming
</commit_message>
<xml_diff>
--- a/Lectures/Design-Of-Experiments/doe_overview.pptx
+++ b/Lectures/Design-Of-Experiments/doe_overview.pptx
@@ -298,7 +298,7 @@
               <a:pPr>
                 <a:defRPr/>
               </a:pPr>
-              <a:t>11/2/22</a:t>
+              <a:t>11/6/22</a:t>
             </a:fld>
             <a:endParaRPr lang="en-US" altLang="x-none"/>
           </a:p>
@@ -507,7 +507,7 @@
               <a:pPr>
                 <a:defRPr/>
               </a:pPr>
-              <a:t>11/2/22</a:t>
+              <a:t>11/6/22</a:t>
             </a:fld>
             <a:endParaRPr lang="en-US" altLang="x-none"/>
           </a:p>
@@ -6078,7 +6078,13 @@
               <a:rPr lang="en-US" altLang="en-US" sz="3200" b="1" u="sng" dirty="0">
                 <a:ea typeface="ＭＳ Ｐゴシック" panose="020B0600070205080204" pitchFamily="34" charset="-128"/>
               </a:rPr>
-              <a:t>Design of Experiments Overview</a:t>
+              <a:t>Design of </a:t>
+            </a:r>
+            <a:r>
+              <a:rPr lang="en-US" altLang="en-US" sz="3200" b="1" u="sng">
+                <a:ea typeface="ＭＳ Ｐゴシック" panose="020B0600070205080204" pitchFamily="34" charset="-128"/>
+              </a:rPr>
+              <a:t>Experiments: Overview</a:t>
             </a:r>
             <a:br>
               <a:rPr lang="en-US" altLang="en-US" sz="3200" b="1" dirty="0">

</xml_diff>